<commit_message>
Maj - Diapos Powerpoint
</commit_message>
<xml_diff>
--- a/presentation.pptx
+++ b/presentation.pptx
@@ -5107,7 +5107,15 @@
           <a:p>
             <a:r>
               <a:rPr lang="fr-FR" dirty="0" smtClean="0"/>
-              <a:t>SERVEUR – API – Arduino</a:t>
+              <a:t>SERVEUR – API </a:t>
+            </a:r>
+            <a:r>
+              <a:rPr lang="fr-FR" smtClean="0"/>
+              <a:t>– </a:t>
+            </a:r>
+            <a:r>
+              <a:rPr lang="fr-FR" smtClean="0"/>
+              <a:t>ARDUINO</a:t>
             </a:r>
             <a:endParaRPr lang="fr-FR" dirty="0"/>
           </a:p>

</xml_diff>